<commit_message>
update paper and ppt
</commit_message>
<xml_diff>
--- a/Paper/Figures.pptx
+++ b/Paper/Figures.pptx
@@ -244,7 +244,7 @@
           <a:p>
             <a:fld id="{27530B1A-49E1-4C40-9321-E95425B2047F}" type="datetimeFigureOut">
               <a:rPr lang="en-US" smtClean="0"/>
-              <a:t>9/16/2022</a:t>
+              <a:t>1/31/2023</a:t>
             </a:fld>
             <a:endParaRPr lang="en-US"/>
           </a:p>
@@ -414,7 +414,7 @@
           <a:p>
             <a:fld id="{27530B1A-49E1-4C40-9321-E95425B2047F}" type="datetimeFigureOut">
               <a:rPr lang="en-US" smtClean="0"/>
-              <a:t>9/16/2022</a:t>
+              <a:t>1/31/2023</a:t>
             </a:fld>
             <a:endParaRPr lang="en-US"/>
           </a:p>
@@ -594,7 +594,7 @@
           <a:p>
             <a:fld id="{27530B1A-49E1-4C40-9321-E95425B2047F}" type="datetimeFigureOut">
               <a:rPr lang="en-US" smtClean="0"/>
-              <a:t>9/16/2022</a:t>
+              <a:t>1/31/2023</a:t>
             </a:fld>
             <a:endParaRPr lang="en-US"/>
           </a:p>
@@ -764,7 +764,7 @@
           <a:p>
             <a:fld id="{27530B1A-49E1-4C40-9321-E95425B2047F}" type="datetimeFigureOut">
               <a:rPr lang="en-US" smtClean="0"/>
-              <a:t>9/16/2022</a:t>
+              <a:t>1/31/2023</a:t>
             </a:fld>
             <a:endParaRPr lang="en-US"/>
           </a:p>
@@ -1008,7 +1008,7 @@
           <a:p>
             <a:fld id="{27530B1A-49E1-4C40-9321-E95425B2047F}" type="datetimeFigureOut">
               <a:rPr lang="en-US" smtClean="0"/>
-              <a:t>9/16/2022</a:t>
+              <a:t>1/31/2023</a:t>
             </a:fld>
             <a:endParaRPr lang="en-US"/>
           </a:p>
@@ -1240,7 +1240,7 @@
           <a:p>
             <a:fld id="{27530B1A-49E1-4C40-9321-E95425B2047F}" type="datetimeFigureOut">
               <a:rPr lang="en-US" smtClean="0"/>
-              <a:t>9/16/2022</a:t>
+              <a:t>1/31/2023</a:t>
             </a:fld>
             <a:endParaRPr lang="en-US"/>
           </a:p>
@@ -1607,7 +1607,7 @@
           <a:p>
             <a:fld id="{27530B1A-49E1-4C40-9321-E95425B2047F}" type="datetimeFigureOut">
               <a:rPr lang="en-US" smtClean="0"/>
-              <a:t>9/16/2022</a:t>
+              <a:t>1/31/2023</a:t>
             </a:fld>
             <a:endParaRPr lang="en-US"/>
           </a:p>
@@ -1725,7 +1725,7 @@
           <a:p>
             <a:fld id="{27530B1A-49E1-4C40-9321-E95425B2047F}" type="datetimeFigureOut">
               <a:rPr lang="en-US" smtClean="0"/>
-              <a:t>9/16/2022</a:t>
+              <a:t>1/31/2023</a:t>
             </a:fld>
             <a:endParaRPr lang="en-US"/>
           </a:p>
@@ -1820,7 +1820,7 @@
           <a:p>
             <a:fld id="{27530B1A-49E1-4C40-9321-E95425B2047F}" type="datetimeFigureOut">
               <a:rPr lang="en-US" smtClean="0"/>
-              <a:t>9/16/2022</a:t>
+              <a:t>1/31/2023</a:t>
             </a:fld>
             <a:endParaRPr lang="en-US"/>
           </a:p>
@@ -2097,7 +2097,7 @@
           <a:p>
             <a:fld id="{27530B1A-49E1-4C40-9321-E95425B2047F}" type="datetimeFigureOut">
               <a:rPr lang="en-US" smtClean="0"/>
-              <a:t>9/16/2022</a:t>
+              <a:t>1/31/2023</a:t>
             </a:fld>
             <a:endParaRPr lang="en-US"/>
           </a:p>
@@ -2354,7 +2354,7 @@
           <a:p>
             <a:fld id="{27530B1A-49E1-4C40-9321-E95425B2047F}" type="datetimeFigureOut">
               <a:rPr lang="en-US" smtClean="0"/>
-              <a:t>9/16/2022</a:t>
+              <a:t>1/31/2023</a:t>
             </a:fld>
             <a:endParaRPr lang="en-US"/>
           </a:p>
@@ -2567,7 +2567,7 @@
           <a:p>
             <a:fld id="{27530B1A-49E1-4C40-9321-E95425B2047F}" type="datetimeFigureOut">
               <a:rPr lang="en-US" smtClean="0"/>
-              <a:t>9/16/2022</a:t>
+              <a:t>1/31/2023</a:t>
             </a:fld>
             <a:endParaRPr lang="en-US"/>
           </a:p>
@@ -2992,36 +2992,6 @@
             <a:chExt cx="16362904" cy="12516876"/>
           </a:xfrm>
         </p:grpSpPr>
-        <p:pic>
-          <p:nvPicPr>
-            <p:cNvPr id="4" name="Picture 3" descr="Graphical user interface&#10;&#10;Description automatically generated">
-              <a:extLst>
-                <a:ext uri="{FF2B5EF4-FFF2-40B4-BE49-F238E27FC236}">
-                  <a16:creationId xmlns:a16="http://schemas.microsoft.com/office/drawing/2014/main" id="{7CA98F26-3273-D2F4-C603-A9832F77F561}"/>
-                </a:ext>
-              </a:extLst>
-            </p:cNvPr>
-            <p:cNvPicPr>
-              <a:picLocks noChangeAspect="1"/>
-            </p:cNvPicPr>
-            <p:nvPr/>
-          </p:nvPicPr>
-          <p:blipFill>
-            <a:blip r:embed="rId2"/>
-            <a:stretch>
-              <a:fillRect/>
-            </a:stretch>
-          </p:blipFill>
-          <p:spPr>
-            <a:xfrm>
-              <a:off x="904253" y="4461389"/>
-              <a:ext cx="6300788" cy="3854768"/>
-            </a:xfrm>
-            <a:prstGeom prst="rect">
-              <a:avLst/>
-            </a:prstGeom>
-          </p:spPr>
-        </p:pic>
         <p:sp>
           <p:nvSpPr>
             <p:cNvPr id="5" name="TextBox 4">
@@ -3072,7 +3042,7 @@
             <p:nvPr/>
           </p:nvPicPr>
           <p:blipFill>
-            <a:blip r:embed="rId3"/>
+            <a:blip r:embed="rId2"/>
             <a:stretch>
               <a:fillRect/>
             </a:stretch>
@@ -3277,7 +3247,7 @@
             <p:nvPr/>
           </p:nvPicPr>
           <p:blipFill>
-            <a:blip r:embed="rId4"/>
+            <a:blip r:embed="rId3"/>
             <a:stretch>
               <a:fillRect/>
             </a:stretch>
@@ -3307,7 +3277,7 @@
             <p:nvPr/>
           </p:nvPicPr>
           <p:blipFill rotWithShape="1">
-            <a:blip r:embed="rId5"/>
+            <a:blip r:embed="rId4"/>
             <a:srcRect r="1065"/>
             <a:stretch/>
           </p:blipFill>
@@ -3336,7 +3306,7 @@
             <p:nvPr/>
           </p:nvPicPr>
           <p:blipFill>
-            <a:blip r:embed="rId6"/>
+            <a:blip r:embed="rId5"/>
             <a:stretch>
               <a:fillRect/>
             </a:stretch>
@@ -3453,7 +3423,7 @@
             <p:nvPr/>
           </p:nvPicPr>
           <p:blipFill>
-            <a:blip r:embed="rId7"/>
+            <a:blip r:embed="rId6"/>
             <a:stretch>
               <a:fillRect/>
             </a:stretch>
@@ -3541,6 +3511,40 @@
           </p:txBody>
         </p:sp>
       </p:grpSp>
+      <p:pic>
+        <p:nvPicPr>
+          <p:cNvPr id="3" name="Picture 2">
+            <a:extLst>
+              <a:ext uri="{FF2B5EF4-FFF2-40B4-BE49-F238E27FC236}">
+                <a16:creationId xmlns:a16="http://schemas.microsoft.com/office/drawing/2014/main" id="{A26F76F2-5A2A-FC9A-0996-8F7B4F96CDF8}"/>
+              </a:ext>
+            </a:extLst>
+          </p:cNvPr>
+          <p:cNvPicPr>
+            <a:picLocks noChangeAspect="1"/>
+          </p:cNvPicPr>
+          <p:nvPr/>
+        </p:nvPicPr>
+        <p:blipFill rotWithShape="1">
+          <a:blip r:embed="rId7"/>
+          <a:srcRect t="1" b="446"/>
+          <a:stretch/>
+        </p:blipFill>
+        <p:spPr>
+          <a:xfrm>
+            <a:off x="1024975" y="4484599"/>
+            <a:ext cx="6050560" cy="4181397"/>
+          </a:xfrm>
+          <a:prstGeom prst="rect">
+            <a:avLst/>
+          </a:prstGeom>
+          <a:ln>
+            <a:solidFill>
+              <a:schemeClr val="tx1"/>
+            </a:solidFill>
+          </a:ln>
+        </p:spPr>
+      </p:pic>
     </p:spTree>
     <p:extLst>
       <p:ext uri="{BB962C8B-B14F-4D97-AF65-F5344CB8AC3E}">

</xml_diff>